<commit_message>
Inconsistency in Fig. 2
</commit_message>
<xml_diff>
--- a/plots/Fig2 feature modification flowchart.pptx
+++ b/plots/Fig2 feature modification flowchart.pptx
@@ -197,7 +197,7 @@
           <a:p>
             <a:fld id="{7FBD6D00-5174-A449-9D44-84A3CC40E9AF}" type="datetimeFigureOut">
               <a:rPr lang="en-US" smtClean="0"/>
-              <a:t>1/2/25</a:t>
+              <a:t>1/6/25</a:t>
             </a:fld>
             <a:endParaRPr lang="en-US"/>
           </a:p>
@@ -680,7 +680,7 @@
           <a:p>
             <a:fld id="{A2BAE022-C88F-2B41-9F90-7F832352A141}" type="datetimeFigureOut">
               <a:rPr lang="en-US" smtClean="0"/>
-              <a:t>1/2/25</a:t>
+              <a:t>1/6/25</a:t>
             </a:fld>
             <a:endParaRPr lang="en-US"/>
           </a:p>
@@ -850,7 +850,7 @@
           <a:p>
             <a:fld id="{A2BAE022-C88F-2B41-9F90-7F832352A141}" type="datetimeFigureOut">
               <a:rPr lang="en-US" smtClean="0"/>
-              <a:t>1/2/25</a:t>
+              <a:t>1/6/25</a:t>
             </a:fld>
             <a:endParaRPr lang="en-US"/>
           </a:p>
@@ -1030,7 +1030,7 @@
           <a:p>
             <a:fld id="{A2BAE022-C88F-2B41-9F90-7F832352A141}" type="datetimeFigureOut">
               <a:rPr lang="en-US" smtClean="0"/>
-              <a:t>1/2/25</a:t>
+              <a:t>1/6/25</a:t>
             </a:fld>
             <a:endParaRPr lang="en-US"/>
           </a:p>
@@ -1200,7 +1200,7 @@
           <a:p>
             <a:fld id="{A2BAE022-C88F-2B41-9F90-7F832352A141}" type="datetimeFigureOut">
               <a:rPr lang="en-US" smtClean="0"/>
-              <a:t>1/2/25</a:t>
+              <a:t>1/6/25</a:t>
             </a:fld>
             <a:endParaRPr lang="en-US"/>
           </a:p>
@@ -1444,7 +1444,7 @@
           <a:p>
             <a:fld id="{A2BAE022-C88F-2B41-9F90-7F832352A141}" type="datetimeFigureOut">
               <a:rPr lang="en-US" smtClean="0"/>
-              <a:t>1/2/25</a:t>
+              <a:t>1/6/25</a:t>
             </a:fld>
             <a:endParaRPr lang="en-US"/>
           </a:p>
@@ -1676,7 +1676,7 @@
           <a:p>
             <a:fld id="{A2BAE022-C88F-2B41-9F90-7F832352A141}" type="datetimeFigureOut">
               <a:rPr lang="en-US" smtClean="0"/>
-              <a:t>1/2/25</a:t>
+              <a:t>1/6/25</a:t>
             </a:fld>
             <a:endParaRPr lang="en-US"/>
           </a:p>
@@ -2043,7 +2043,7 @@
           <a:p>
             <a:fld id="{A2BAE022-C88F-2B41-9F90-7F832352A141}" type="datetimeFigureOut">
               <a:rPr lang="en-US" smtClean="0"/>
-              <a:t>1/2/25</a:t>
+              <a:t>1/6/25</a:t>
             </a:fld>
             <a:endParaRPr lang="en-US"/>
           </a:p>
@@ -2161,7 +2161,7 @@
           <a:p>
             <a:fld id="{A2BAE022-C88F-2B41-9F90-7F832352A141}" type="datetimeFigureOut">
               <a:rPr lang="en-US" smtClean="0"/>
-              <a:t>1/2/25</a:t>
+              <a:t>1/6/25</a:t>
             </a:fld>
             <a:endParaRPr lang="en-US"/>
           </a:p>
@@ -2256,7 +2256,7 @@
           <a:p>
             <a:fld id="{A2BAE022-C88F-2B41-9F90-7F832352A141}" type="datetimeFigureOut">
               <a:rPr lang="en-US" smtClean="0"/>
-              <a:t>1/2/25</a:t>
+              <a:t>1/6/25</a:t>
             </a:fld>
             <a:endParaRPr lang="en-US"/>
           </a:p>
@@ -2533,7 +2533,7 @@
           <a:p>
             <a:fld id="{A2BAE022-C88F-2B41-9F90-7F832352A141}" type="datetimeFigureOut">
               <a:rPr lang="en-US" smtClean="0"/>
-              <a:t>1/2/25</a:t>
+              <a:t>1/6/25</a:t>
             </a:fld>
             <a:endParaRPr lang="en-US"/>
           </a:p>
@@ -2790,7 +2790,7 @@
           <a:p>
             <a:fld id="{A2BAE022-C88F-2B41-9F90-7F832352A141}" type="datetimeFigureOut">
               <a:rPr lang="en-US" smtClean="0"/>
-              <a:t>1/2/25</a:t>
+              <a:t>1/6/25</a:t>
             </a:fld>
             <a:endParaRPr lang="en-US"/>
           </a:p>
@@ -3003,7 +3003,7 @@
           <a:p>
             <a:fld id="{A2BAE022-C88F-2B41-9F90-7F832352A141}" type="datetimeFigureOut">
               <a:rPr lang="en-US" smtClean="0"/>
-              <a:t>1/2/25</a:t>
+              <a:t>1/6/25</a:t>
             </a:fld>
             <a:endParaRPr lang="en-US"/>
           </a:p>
@@ -6610,8 +6610,19 @@
                                 <a:latin typeface="Helvetica" pitchFamily="2" charset="0"/>
                                 <a:cs typeface="Times New Roman" panose="02020603050405020304" pitchFamily="18" charset="0"/>
                               </a:rPr>
-                              <a:t> = T</a:t>
+                              <a:t> </a:t>
                             </a:r>
+                            <a:r>
+                              <a:rPr lang="en-US" sz="900">
+                                <a:latin typeface="Helvetica" pitchFamily="2" charset="0"/>
+                                <a:cs typeface="Times New Roman" panose="02020603050405020304" pitchFamily="18" charset="0"/>
+                              </a:rPr>
+                              <a:t>= TRUE</a:t>
+                            </a:r>
+                            <a:endParaRPr lang="en-US" sz="900" dirty="0">
+                              <a:latin typeface="Helvetica" pitchFamily="2" charset="0"/>
+                              <a:cs typeface="Times New Roman" panose="02020603050405020304" pitchFamily="18" charset="0"/>
+                            </a:endParaRPr>
                           </a:p>
                         </p:txBody>
                       </p:sp>

</xml_diff>